<commit_message>
Ajuste no arquivo i18n.pptx.
</commit_message>
<xml_diff>
--- a/I18N/I18n.pptx
+++ b/I18N/I18n.pptx
@@ -120,7 +120,7 @@
   </p:defaultTextStyle>
   <p:extLst>
     <p:ext uri="{EFAFB233-063F-42B5-8137-9DF3F51BA10A}">
-      <p15:sldGuideLst xmlns:p15="http://schemas.microsoft.com/office/powerpoint/2012/main" xmlns="">
+      <p15:sldGuideLst xmlns="" xmlns:p15="http://schemas.microsoft.com/office/powerpoint/2012/main">
         <p15:guide id="1" orient="horz" pos="2160">
           <p15:clr>
             <a:srgbClr val="A4A3A4"/>
@@ -134,7 +134,7 @@
       </p15:sldGuideLst>
     </p:ext>
     <p:ext uri="{2D200454-40CA-4A62-9FC3-DE9A4176ACB9}">
-      <p15:notesGuideLst xmlns:p15="http://schemas.microsoft.com/office/powerpoint/2012/main" xmlns="">
+      <p15:notesGuideLst xmlns="" xmlns:p15="http://schemas.microsoft.com/office/powerpoint/2012/main">
         <p15:guide id="1" orient="horz" pos="2880">
           <p15:clr>
             <a:srgbClr val="A4A3A4"/>
@@ -234,7 +234,7 @@
             <a:fld id="{0164AB14-D132-4CB9-9B60-02409EE5CC87}" type="datetimeFigureOut">
               <a:rPr lang="pt-BR" smtClean="0"/>
               <a:pPr/>
-              <a:t>06/08/2013</a:t>
+              <a:t>07/08/2013</a:t>
             </a:fld>
             <a:endParaRPr lang="pt-BR"/>
           </a:p>
@@ -405,7 +405,7 @@
     </p:spTree>
     <p:extLst>
       <p:ext uri="{BB962C8B-B14F-4D97-AF65-F5344CB8AC3E}">
-        <p14:creationId xmlns:p14="http://schemas.microsoft.com/office/powerpoint/2010/main" xmlns="" val="560419655"/>
+        <p14:creationId xmlns="" xmlns:p14="http://schemas.microsoft.com/office/powerpoint/2010/main" val="560419655"/>
       </p:ext>
     </p:extLst>
   </p:cSld>
@@ -580,7 +580,7 @@
     </p:spTree>
     <p:extLst>
       <p:ext uri="{BB962C8B-B14F-4D97-AF65-F5344CB8AC3E}">
-        <p14:creationId xmlns:p14="http://schemas.microsoft.com/office/powerpoint/2010/main" xmlns="" val="125843076"/>
+        <p14:creationId xmlns="" xmlns:p14="http://schemas.microsoft.com/office/powerpoint/2010/main" val="125843076"/>
       </p:ext>
     </p:extLst>
   </p:cSld>
@@ -962,7 +962,7 @@
     </p:spTree>
     <p:extLst>
       <p:ext uri="{BB962C8B-B14F-4D97-AF65-F5344CB8AC3E}">
-        <p14:creationId xmlns:p14="http://schemas.microsoft.com/office/powerpoint/2010/main" xmlns="" val="1617920986"/>
+        <p14:creationId xmlns="" xmlns:p14="http://schemas.microsoft.com/office/powerpoint/2010/main" val="1617920986"/>
       </p:ext>
     </p:extLst>
   </p:cSld>
@@ -1213,7 +1213,7 @@
     </p:spTree>
     <p:extLst>
       <p:ext uri="{BB962C8B-B14F-4D97-AF65-F5344CB8AC3E}">
-        <p14:creationId xmlns:p14="http://schemas.microsoft.com/office/powerpoint/2010/main" xmlns="" val="2232295392"/>
+        <p14:creationId xmlns="" xmlns:p14="http://schemas.microsoft.com/office/powerpoint/2010/main" val="2232295392"/>
       </p:ext>
     </p:extLst>
   </p:cSld>
@@ -2037,7 +2037,7 @@
     </p:spTree>
     <p:extLst>
       <p:ext uri="{BB962C8B-B14F-4D97-AF65-F5344CB8AC3E}">
-        <p14:creationId xmlns:p14="http://schemas.microsoft.com/office/powerpoint/2010/main" xmlns="" val="4213680168"/>
+        <p14:creationId xmlns="" xmlns:p14="http://schemas.microsoft.com/office/powerpoint/2010/main" val="4213680168"/>
       </p:ext>
     </p:extLst>
   </p:cSld>
@@ -2439,7 +2439,7 @@
     </p:spTree>
     <p:extLst>
       <p:ext uri="{BB962C8B-B14F-4D97-AF65-F5344CB8AC3E}">
-        <p14:creationId xmlns:p14="http://schemas.microsoft.com/office/powerpoint/2010/main" xmlns="" val="2213364434"/>
+        <p14:creationId xmlns="" xmlns:p14="http://schemas.microsoft.com/office/powerpoint/2010/main" val="2213364434"/>
       </p:ext>
     </p:extLst>
   </p:cSld>
@@ -2784,7 +2784,7 @@
     </p:spTree>
     <p:extLst>
       <p:ext uri="{BB962C8B-B14F-4D97-AF65-F5344CB8AC3E}">
-        <p14:creationId xmlns:p14="http://schemas.microsoft.com/office/powerpoint/2010/main" xmlns="" val="3758821294"/>
+        <p14:creationId xmlns="" xmlns:p14="http://schemas.microsoft.com/office/powerpoint/2010/main" val="3758821294"/>
       </p:ext>
     </p:extLst>
   </p:cSld>
@@ -2931,7 +2931,7 @@
           <a:blip r:embed="rId3" cstate="print">
             <a:extLst>
               <a:ext uri="{28A0092B-C50C-407E-A947-70E740481C1C}">
-                <a14:useLocalDpi xmlns:a14="http://schemas.microsoft.com/office/drawing/2010/main" xmlns="" val="0"/>
+                <a14:useLocalDpi xmlns="" xmlns:a14="http://schemas.microsoft.com/office/drawing/2010/main" val="0"/>
               </a:ext>
             </a:extLst>
           </a:blip>
@@ -3335,7 +3335,7 @@
     </p:spTree>
     <p:extLst>
       <p:ext uri="{BB962C8B-B14F-4D97-AF65-F5344CB8AC3E}">
-        <p14:creationId xmlns:p14="http://schemas.microsoft.com/office/powerpoint/2010/main" xmlns="" val="3885010616"/>
+        <p14:creationId xmlns="" xmlns:p14="http://schemas.microsoft.com/office/powerpoint/2010/main" val="3885010616"/>
       </p:ext>
     </p:extLst>
   </p:cSld>
@@ -3685,7 +3685,7 @@
     </p:spTree>
     <p:extLst>
       <p:ext uri="{BB962C8B-B14F-4D97-AF65-F5344CB8AC3E}">
-        <p14:creationId xmlns:p14="http://schemas.microsoft.com/office/powerpoint/2010/main" xmlns="" val="365913493"/>
+        <p14:creationId xmlns="" xmlns:p14="http://schemas.microsoft.com/office/powerpoint/2010/main" val="365913493"/>
       </p:ext>
     </p:extLst>
   </p:cSld>
@@ -4035,7 +4035,15 @@
           <a:p>
             <a:r>
               <a:rPr lang="en-US" dirty="0" smtClean="0"/>
-              <a:t>I18n</a:t>
+              <a:t>i</a:t>
+            </a:r>
+            <a:r>
+              <a:rPr lang="en-US" dirty="0" smtClean="0"/>
+              <a:t>18n</a:t>
+            </a:r>
+            <a:r>
+              <a:rPr lang="en-US" dirty="0" smtClean="0"/>
+              <a:t/>
             </a:r>
             <a:br>
               <a:rPr lang="en-US" dirty="0" smtClean="0"/>
@@ -4091,7 +4099,7 @@
     </p:spTree>
     <p:extLst>
       <p:ext uri="{BB962C8B-B14F-4D97-AF65-F5344CB8AC3E}">
-        <p14:creationId xmlns:p14="http://schemas.microsoft.com/office/powerpoint/2010/main" xmlns="" val="206614493"/>
+        <p14:creationId xmlns="" xmlns:p14="http://schemas.microsoft.com/office/powerpoint/2010/main" val="206614493"/>
       </p:ext>
     </p:extLst>
   </p:cSld>
@@ -4176,7 +4184,7 @@
             </a:br>
             <a:r>
               <a:rPr lang="en-US" sz="2000" dirty="0" smtClean="0"/>
-              <a:t>(34) 9100-0819</a:t>
+              <a:t>hildeunn@teltools.com.br</a:t>
             </a:r>
             <a:endParaRPr lang="en-US" sz="2800" b="1" dirty="0"/>
           </a:p>
@@ -4185,7 +4193,7 @@
     </p:spTree>
     <p:extLst>
       <p:ext uri="{BB962C8B-B14F-4D97-AF65-F5344CB8AC3E}">
-        <p14:creationId xmlns:p14="http://schemas.microsoft.com/office/powerpoint/2010/main" xmlns="" val="353308652"/>
+        <p14:creationId xmlns="" xmlns:p14="http://schemas.microsoft.com/office/powerpoint/2010/main" val="353308652"/>
       </p:ext>
     </p:extLst>
   </p:cSld>
@@ -4222,7 +4230,7 @@
     </p:spTree>
     <p:extLst>
       <p:ext uri="{BB962C8B-B14F-4D97-AF65-F5344CB8AC3E}">
-        <p14:creationId xmlns:p14="http://schemas.microsoft.com/office/powerpoint/2010/main" xmlns="" val="1680788143"/>
+        <p14:creationId xmlns="" xmlns:p14="http://schemas.microsoft.com/office/powerpoint/2010/main" val="1680788143"/>
       </p:ext>
     </p:extLst>
   </p:cSld>
@@ -4393,13 +4401,10 @@
               <a:t>Um sistema ou aplicação que vise o mercado externo deve prover suporte com relação ao idioma de interface com o usuário seja através do idioma do país ou algum outro de melhor </a:t>
             </a:r>
             <a:r>
-              <a:rPr lang="pt-BR" sz="2800" dirty="0" err="1" smtClean="0"/>
-              <a:t>compreenção</a:t>
-            </a:r>
-            <a:r>
               <a:rPr lang="pt-BR" sz="2800" dirty="0" smtClean="0"/>
-              <a:t>.</a:t>
-            </a:r>
+              <a:t>compreensão.</a:t>
+            </a:r>
+            <a:endParaRPr lang="pt-BR" sz="2800" dirty="0" smtClean="0"/>
           </a:p>
           <a:p>
             <a:r>
@@ -4420,7 +4425,11 @@
             </a:r>
             <a:r>
               <a:rPr lang="pt-BR" sz="2800" dirty="0" smtClean="0"/>
-              <a:t>-I18N se propõe a fazer.</a:t>
+              <a:t>-i18n </a:t>
+            </a:r>
+            <a:r>
+              <a:rPr lang="pt-BR" sz="2800" dirty="0" smtClean="0"/>
+              <a:t>se propõe a fazer.</a:t>
             </a:r>
           </a:p>
           <a:p>
@@ -4518,11 +4527,20 @@
           <a:lstStyle/>
           <a:p>
             <a:pPr algn="just">
-              <a:buNone/>
+              <a:buFont typeface="Wingdings" pitchFamily="2" charset="2"/>
+              <a:buChar char="q"/>
             </a:pPr>
             <a:r>
               <a:rPr lang="en-US" sz="2600" dirty="0" smtClean="0"/>
-              <a:t>    I18n é </a:t>
+              <a:t>i</a:t>
+            </a:r>
+            <a:r>
+              <a:rPr lang="en-US" sz="2600" dirty="0" smtClean="0"/>
+              <a:t>18n </a:t>
+            </a:r>
+            <a:r>
+              <a:rPr lang="en-US" sz="2600" dirty="0" smtClean="0"/>
+              <a:t>é </a:t>
             </a:r>
             <a:r>
               <a:rPr lang="pt-BR" sz="2600" dirty="0" smtClean="0"/>
@@ -4559,7 +4577,7 @@
     </p:spTree>
     <p:extLst>
       <p:ext uri="{BB962C8B-B14F-4D97-AF65-F5344CB8AC3E}">
-        <p14:creationId xmlns:p14="http://schemas.microsoft.com/office/powerpoint/2010/main" xmlns="" val="3955646432"/>
+        <p14:creationId xmlns="" xmlns:p14="http://schemas.microsoft.com/office/powerpoint/2010/main" val="3955646432"/>
       </p:ext>
     </p:extLst>
   </p:cSld>
@@ -4645,11 +4663,20 @@
           <a:lstStyle/>
           <a:p>
             <a:pPr algn="just">
-              <a:buNone/>
+              <a:buFont typeface="Wingdings" pitchFamily="2" charset="2"/>
+              <a:buChar char="q"/>
             </a:pPr>
             <a:r>
               <a:rPr lang="pt-BR" sz="2200" dirty="0" smtClean="0"/>
-              <a:t>O I18N utiliza arquivos do tipo ".</a:t>
+              <a:t>O </a:t>
+            </a:r>
+            <a:r>
+              <a:rPr lang="pt-BR" sz="2200" dirty="0" smtClean="0"/>
+              <a:t>i18n </a:t>
+            </a:r>
+            <a:r>
+              <a:rPr lang="pt-BR" sz="2200" dirty="0" smtClean="0"/>
+              <a:t>utiliza arquivos do tipo ".</a:t>
             </a:r>
             <a:r>
               <a:rPr lang="pt-BR" sz="2200" dirty="0" err="1" smtClean="0"/>
@@ -4662,7 +4689,8 @@
           </a:p>
           <a:p>
             <a:pPr algn="just">
-              <a:buNone/>
+              <a:buFont typeface="Wingdings" pitchFamily="2" charset="2"/>
+              <a:buChar char="q"/>
             </a:pPr>
             <a:r>
               <a:rPr lang="pt-BR" sz="2200" dirty="0" smtClean="0"/>
@@ -4722,18 +4750,17 @@
             </a:r>
             <a:r>
               <a:rPr lang="pt-BR" sz="2200" dirty="0" smtClean="0"/>
-              <a:t>) dessa forma a linguagem padrão está sempre disponível informando termos que não podem ser traduzidos.</a:t>
-            </a:r>
-          </a:p>
-          <a:p>
-            <a:pPr algn="just">
-              <a:buNone/>
-            </a:pPr>
-            <a:r>
-              <a:rPr lang="pt-BR" sz="2400" dirty="0" smtClean="0"/>
-              <a:t>Exemplo:</a:t>
-            </a:r>
-            <a:endParaRPr lang="en-US" sz="2400" dirty="0"/>
+              <a:t>) dessa forma a linguagem padrão está sempre disponível informando termos que não podem ser </a:t>
+            </a:r>
+            <a:r>
+              <a:rPr lang="pt-BR" sz="2200" dirty="0" smtClean="0"/>
+              <a:t>traduzidos</a:t>
+            </a:r>
+            <a:r>
+              <a:rPr lang="pt-BR" sz="2200" dirty="0" smtClean="0"/>
+              <a:t>.</a:t>
+            </a:r>
+            <a:endParaRPr lang="pt-BR" sz="2200" dirty="0" smtClean="0"/>
           </a:p>
         </p:txBody>
       </p:sp>
@@ -5065,7 +5092,7 @@
     </p:spTree>
     <p:extLst>
       <p:ext uri="{BB962C8B-B14F-4D97-AF65-F5344CB8AC3E}">
-        <p14:creationId xmlns:p14="http://schemas.microsoft.com/office/powerpoint/2010/main" xmlns="" val="3955646432"/>
+        <p14:creationId xmlns="" xmlns:p14="http://schemas.microsoft.com/office/powerpoint/2010/main" val="3955646432"/>
       </p:ext>
     </p:extLst>
   </p:cSld>
@@ -5130,45 +5157,6 @@
           </a:p>
         </p:txBody>
       </p:sp>
-      <p:sp>
-        <p:nvSpPr>
-          <p:cNvPr id="4" name="Content Placeholder 3"/>
-          <p:cNvSpPr>
-            <a:spLocks noGrp="1"/>
-          </p:cNvSpPr>
-          <p:nvPr>
-            <p:ph sz="quarter" idx="10"/>
-          </p:nvPr>
-        </p:nvSpPr>
-        <p:spPr>
-          <a:xfrm>
-            <a:off x="251520" y="1556793"/>
-            <a:ext cx="8712967" cy="2160240"/>
-          </a:xfrm>
-        </p:spPr>
-        <p:txBody>
-          <a:bodyPr/>
-          <a:lstStyle/>
-          <a:p>
-            <a:pPr algn="just">
-              <a:buNone/>
-            </a:pPr>
-            <a:r>
-              <a:rPr lang="pt-BR" sz="2400" dirty="0" smtClean="0"/>
-              <a:t>Invocar o </a:t>
-            </a:r>
-            <a:r>
-              <a:rPr lang="pt-BR" sz="2400" dirty="0" err="1" smtClean="0"/>
-              <a:t>plugin</a:t>
-            </a:r>
-            <a:r>
-              <a:rPr lang="pt-BR" sz="2400" dirty="0" smtClean="0"/>
-              <a:t>:</a:t>
-            </a:r>
-            <a:endParaRPr lang="en-US" sz="2400" dirty="0"/>
-          </a:p>
-        </p:txBody>
-      </p:sp>
       <p:pic>
         <p:nvPicPr>
           <p:cNvPr id="9" name="Imagem 8" descr="teste-js.png"/>
@@ -5185,8 +5173,8 @@
         </p:blipFill>
         <p:spPr>
           <a:xfrm>
-            <a:off x="3707904" y="1268760"/>
-            <a:ext cx="4734586" cy="3553321"/>
+            <a:off x="3707903" y="1772816"/>
+            <a:ext cx="5085155" cy="3816424"/>
           </a:xfrm>
           <a:prstGeom prst="rect">
             <a:avLst/>
@@ -5201,7 +5189,7 @@
         </p:nvSpPr>
         <p:spPr>
           <a:xfrm>
-            <a:off x="323528" y="2276871"/>
+            <a:off x="323528" y="1803588"/>
             <a:ext cx="3096344" cy="3785652"/>
           </a:xfrm>
           <a:prstGeom prst="rect">
@@ -5475,7 +5463,7 @@
     </p:spTree>
     <p:extLst>
       <p:ext uri="{BB962C8B-B14F-4D97-AF65-F5344CB8AC3E}">
-        <p14:creationId xmlns:p14="http://schemas.microsoft.com/office/powerpoint/2010/main" xmlns="" val="3955646432"/>
+        <p14:creationId xmlns="" xmlns:p14="http://schemas.microsoft.com/office/powerpoint/2010/main" val="3955646432"/>
       </p:ext>
     </p:extLst>
   </p:cSld>
@@ -5553,7 +5541,7 @@
         <p:spPr>
           <a:xfrm>
             <a:off x="251520" y="1556792"/>
-            <a:ext cx="8712967" cy="3384375"/>
+            <a:ext cx="8712967" cy="4536504"/>
           </a:xfrm>
         </p:spPr>
         <p:txBody>
@@ -5561,7 +5549,8 @@
           <a:lstStyle/>
           <a:p>
             <a:pPr algn="just">
-              <a:buNone/>
+              <a:buFont typeface="Wingdings" pitchFamily="2" charset="2"/>
+              <a:buChar char="q"/>
             </a:pPr>
             <a:r>
               <a:rPr lang="pt-BR" sz="2000" dirty="0" smtClean="0"/>
@@ -5580,7 +5569,15 @@
             </a:pPr>
             <a:r>
               <a:rPr lang="pt-BR" sz="2000" dirty="0" smtClean="0"/>
-              <a:t>declaração no “.</a:t>
+              <a:t>D</a:t>
+            </a:r>
+            <a:r>
+              <a:rPr lang="pt-BR" sz="2000" dirty="0" smtClean="0"/>
+              <a:t>eclaração </a:t>
+            </a:r>
+            <a:r>
+              <a:rPr lang="pt-BR" sz="2000" dirty="0" smtClean="0"/>
+              <a:t>no “.</a:t>
             </a:r>
             <a:r>
               <a:rPr lang="pt-BR" sz="2000" dirty="0" err="1" smtClean="0"/>
@@ -5589,31 +5586,6 @@
             <a:r>
               <a:rPr lang="pt-BR" sz="2000" dirty="0" smtClean="0"/>
               <a:t>”:</a:t>
-            </a:r>
-          </a:p>
-          <a:p>
-            <a:pPr algn="just">
-              <a:buNone/>
-            </a:pPr>
-            <a:r>
-              <a:rPr lang="pt-BR" sz="2000" dirty="0" smtClean="0"/>
-              <a:t>	</a:t>
-            </a:r>
-            <a:r>
-              <a:rPr lang="pt-BR" sz="2000" dirty="0" err="1" smtClean="0"/>
-              <a:t>msg_hello</a:t>
-            </a:r>
-            <a:r>
-              <a:rPr lang="pt-BR" sz="2000" dirty="0" smtClean="0"/>
-              <a:t> = </a:t>
-            </a:r>
-            <a:r>
-              <a:rPr lang="pt-BR" sz="2000" dirty="0" err="1" smtClean="0"/>
-              <a:t>Hello</a:t>
-            </a:r>
-            <a:r>
-              <a:rPr lang="pt-BR" sz="2000" dirty="0" smtClean="0"/>
-              <a:t> {0}!!</a:t>
             </a:r>
           </a:p>
           <a:p>
@@ -5628,40 +5600,7 @@
             </a:pPr>
             <a:r>
               <a:rPr lang="pt-BR" sz="2000" dirty="0" smtClean="0"/>
-              <a:t>Acessando a variável pelo mapa:</a:t>
-            </a:r>
-          </a:p>
-          <a:p>
-            <a:pPr algn="just">
-              <a:buNone/>
-            </a:pPr>
-            <a:r>
-              <a:rPr lang="pt-BR" sz="2000" dirty="0" smtClean="0"/>
-              <a:t>    </a:t>
-            </a:r>
-            <a:r>
-              <a:rPr lang="pt-BR" sz="2000" dirty="0" err="1" smtClean="0"/>
-              <a:t>jQuery</a:t>
-            </a:r>
-            <a:r>
-              <a:rPr lang="pt-BR" sz="2000" dirty="0" smtClean="0"/>
-              <a:t>.i18n.</a:t>
-            </a:r>
-            <a:r>
-              <a:rPr lang="pt-BR" sz="2000" dirty="0" err="1" smtClean="0"/>
-              <a:t>prop</a:t>
-            </a:r>
-            <a:r>
-              <a:rPr lang="pt-BR" sz="2000" dirty="0" smtClean="0"/>
-              <a:t>('</a:t>
-            </a:r>
-            <a:r>
-              <a:rPr lang="pt-BR" sz="2000" dirty="0" err="1" smtClean="0"/>
-              <a:t>msg_hello</a:t>
-            </a:r>
-            <a:r>
-              <a:rPr lang="pt-BR" sz="2000" dirty="0" smtClean="0"/>
-              <a:t>', ['Luis']);</a:t>
+              <a:t>	</a:t>
             </a:r>
           </a:p>
           <a:p>
@@ -5674,14 +5613,82 @@
             <a:pPr algn="just">
               <a:buNone/>
             </a:pPr>
+            <a:r>
+              <a:rPr lang="pt-BR" sz="2000" dirty="0" smtClean="0"/>
+              <a:t>Acessando a variável pelo </a:t>
+            </a:r>
+            <a:r>
+              <a:rPr lang="pt-BR" sz="2000" dirty="0" smtClean="0"/>
+              <a:t>mapa informando um parâmetro:</a:t>
+            </a:r>
+            <a:endParaRPr lang="pt-BR" sz="2000" dirty="0" smtClean="0"/>
+          </a:p>
+          <a:p>
+            <a:pPr algn="just">
+              <a:buNone/>
+            </a:pPr>
+            <a:endParaRPr lang="pt-BR" sz="2000" dirty="0" smtClean="0"/>
+          </a:p>
+          <a:p>
+            <a:pPr algn="just">
+              <a:buNone/>
+            </a:pPr>
             <a:endParaRPr lang="en-US" sz="2000" dirty="0"/>
           </a:p>
         </p:txBody>
       </p:sp>
+      <p:pic>
+        <p:nvPicPr>
+          <p:cNvPr id="5" name="Imagem 4" descr="recurso1.png"/>
+          <p:cNvPicPr>
+            <a:picLocks noChangeAspect="1"/>
+          </p:cNvPicPr>
+          <p:nvPr/>
+        </p:nvPicPr>
+        <p:blipFill>
+          <a:blip r:embed="rId2" cstate="print"/>
+          <a:stretch>
+            <a:fillRect/>
+          </a:stretch>
+        </p:blipFill>
+        <p:spPr>
+          <a:xfrm>
+            <a:off x="2969898" y="2853218"/>
+            <a:ext cx="2610214" cy="647790"/>
+          </a:xfrm>
+          <a:prstGeom prst="rect">
+            <a:avLst/>
+          </a:prstGeom>
+        </p:spPr>
+      </p:pic>
+      <p:pic>
+        <p:nvPicPr>
+          <p:cNvPr id="6" name="Imagem 5" descr="recurso1_js.png"/>
+          <p:cNvPicPr>
+            <a:picLocks noChangeAspect="1"/>
+          </p:cNvPicPr>
+          <p:nvPr/>
+        </p:nvPicPr>
+        <p:blipFill>
+          <a:blip r:embed="rId3" cstate="print"/>
+          <a:stretch>
+            <a:fillRect/>
+          </a:stretch>
+        </p:blipFill>
+        <p:spPr>
+          <a:xfrm>
+            <a:off x="2384870" y="4437112"/>
+            <a:ext cx="3915322" cy="847843"/>
+          </a:xfrm>
+          <a:prstGeom prst="rect">
+            <a:avLst/>
+          </a:prstGeom>
+        </p:spPr>
+      </p:pic>
     </p:spTree>
     <p:extLst>
       <p:ext uri="{BB962C8B-B14F-4D97-AF65-F5344CB8AC3E}">
-        <p14:creationId xmlns:p14="http://schemas.microsoft.com/office/powerpoint/2010/main" xmlns="" val="3955646432"/>
+        <p14:creationId xmlns="" xmlns:p14="http://schemas.microsoft.com/office/powerpoint/2010/main" val="3955646432"/>
       </p:ext>
     </p:extLst>
   </p:cSld>
@@ -5756,8 +5763,8 @@
         </p:blipFill>
         <p:spPr>
           <a:xfrm>
-            <a:off x="683568" y="2022114"/>
-            <a:ext cx="2287512" cy="2092452"/>
+            <a:off x="755576" y="2177533"/>
+            <a:ext cx="2489875" cy="2849857"/>
           </a:xfrm>
         </p:spPr>
       </p:pic>
@@ -5769,7 +5776,7 @@
         </p:nvCxnSpPr>
         <p:spPr>
           <a:xfrm>
-            <a:off x="2843808" y="2924944"/>
+            <a:off x="3546532" y="3616105"/>
             <a:ext cx="1872208" cy="1588"/>
           </a:xfrm>
           <a:prstGeom prst="straightConnector1">
@@ -5810,8 +5817,8 @@
         </p:blipFill>
         <p:spPr>
           <a:xfrm>
-            <a:off x="5148064" y="2204864"/>
-            <a:ext cx="2343477" cy="2038635"/>
+            <a:off x="5652120" y="2152801"/>
+            <a:ext cx="2561883" cy="3004391"/>
           </a:xfrm>
           <a:prstGeom prst="rect">
             <a:avLst/>
@@ -5821,7 +5828,7 @@
     </p:spTree>
     <p:extLst>
       <p:ext uri="{BB962C8B-B14F-4D97-AF65-F5344CB8AC3E}">
-        <p14:creationId xmlns:p14="http://schemas.microsoft.com/office/powerpoint/2010/main" xmlns="" val="3955646432"/>
+        <p14:creationId xmlns="" xmlns:p14="http://schemas.microsoft.com/office/powerpoint/2010/main" val="3955646432"/>
       </p:ext>
     </p:extLst>
   </p:cSld>
@@ -5937,7 +5944,9 @@
             </a:r>
           </a:p>
           <a:p>
-            <a:pPr lvl="1"/>
+            <a:pPr lvl="1">
+              <a:buNone/>
+            </a:pPr>
             <a:r>
               <a:rPr lang="pt-BR" sz="2000" dirty="0" smtClean="0"/>
               <a:t>https://code.google.com/p/jquery-i18n-properties/downloads/list</a:t>
@@ -5950,7 +5959,9 @@
             </a:r>
           </a:p>
           <a:p>
-            <a:pPr lvl="1"/>
+            <a:pPr lvl="1">
+              <a:buNone/>
+            </a:pPr>
             <a:r>
               <a:rPr lang="pt-BR" sz="2000" dirty="0" smtClean="0"/>
               <a:t>https://github.com/teltools/labs-jquery-i18n</a:t>
@@ -5963,7 +5974,9 @@
             </a:r>
           </a:p>
           <a:p>
-            <a:pPr lvl="1"/>
+            <a:pPr lvl="1">
+              <a:buNone/>
+            </a:pPr>
             <a:r>
               <a:rPr lang="pt-BR" sz="2000" dirty="0" smtClean="0"/>
               <a:t>https://code.google.com/p/jquery-i18n-properties/</a:t>
@@ -5974,7 +5987,7 @@
     </p:spTree>
     <p:extLst>
       <p:ext uri="{BB962C8B-B14F-4D97-AF65-F5344CB8AC3E}">
-        <p14:creationId xmlns:p14="http://schemas.microsoft.com/office/powerpoint/2010/main" xmlns="" val="3955646432"/>
+        <p14:creationId xmlns="" xmlns:p14="http://schemas.microsoft.com/office/powerpoint/2010/main" val="3955646432"/>
       </p:ext>
     </p:extLst>
   </p:cSld>

</xml_diff>